<commit_message>
updated HIBERNATE INTERVIEW QUESTIONS.pptx
</commit_message>
<xml_diff>
--- a/HIBERNATE INTERVIEW QUESTIONS.pptx
+++ b/HIBERNATE INTERVIEW QUESTIONS.pptx
@@ -872,7 +872,7 @@
             <a:fld id="{B61BEF0D-F0BB-DE4B-95CE-6DB70DBA9567}" type="datetimeFigureOut">
               <a:rPr lang="en-US" dirty="0"/>
               <a:pPr/>
-              <a:t>7/19/2018</a:t>
+              <a:t>7/20/2018</a:t>
             </a:fld>
             <a:endParaRPr lang="en-US" dirty="0"/>
           </a:p>
@@ -1120,7 +1120,7 @@
             <a:fld id="{B61BEF0D-F0BB-DE4B-95CE-6DB70DBA9567}" type="datetimeFigureOut">
               <a:rPr lang="en-US" dirty="0"/>
               <a:pPr/>
-              <a:t>7/19/2018</a:t>
+              <a:t>7/20/2018</a:t>
             </a:fld>
             <a:endParaRPr lang="en-US" dirty="0"/>
           </a:p>
@@ -1431,7 +1431,7 @@
             <a:fld id="{B61BEF0D-F0BB-DE4B-95CE-6DB70DBA9567}" type="datetimeFigureOut">
               <a:rPr lang="en-US" dirty="0"/>
               <a:pPr/>
-              <a:t>7/19/2018</a:t>
+              <a:t>7/20/2018</a:t>
             </a:fld>
             <a:endParaRPr lang="en-US" dirty="0"/>
           </a:p>
@@ -1755,7 +1755,7 @@
             <a:fld id="{B61BEF0D-F0BB-DE4B-95CE-6DB70DBA9567}" type="datetimeFigureOut">
               <a:rPr lang="en-US" dirty="0"/>
               <a:pPr/>
-              <a:t>7/19/2018</a:t>
+              <a:t>7/20/2018</a:t>
             </a:fld>
             <a:endParaRPr lang="en-US" dirty="0"/>
           </a:p>
@@ -2066,7 +2066,7 @@
             <a:fld id="{B61BEF0D-F0BB-DE4B-95CE-6DB70DBA9567}" type="datetimeFigureOut">
               <a:rPr lang="en-US" dirty="0"/>
               <a:pPr/>
-              <a:t>7/19/2018</a:t>
+              <a:t>7/20/2018</a:t>
             </a:fld>
             <a:endParaRPr lang="en-US" dirty="0"/>
           </a:p>
@@ -2450,7 +2450,7 @@
             <a:fld id="{B61BEF0D-F0BB-DE4B-95CE-6DB70DBA9567}" type="datetimeFigureOut">
               <a:rPr lang="en-US" dirty="0"/>
               <a:pPr/>
-              <a:t>7/19/2018</a:t>
+              <a:t>7/20/2018</a:t>
             </a:fld>
             <a:endParaRPr lang="en-US" dirty="0"/>
           </a:p>
@@ -2616,7 +2616,7 @@
           <a:p>
             <a:fld id="{55C6B4A9-1611-4792-9094-5F34BCA07E0B}" type="datetimeFigureOut">
               <a:rPr lang="en-US" dirty="0"/>
-              <a:t>7/19/2018</a:t>
+              <a:t>7/20/2018</a:t>
             </a:fld>
             <a:endParaRPr lang="en-US" dirty="0"/>
           </a:p>
@@ -2792,7 +2792,7 @@
             <a:fld id="{B61BEF0D-F0BB-DE4B-95CE-6DB70DBA9567}" type="datetimeFigureOut">
               <a:rPr lang="en-US" dirty="0"/>
               <a:pPr/>
-              <a:t>7/19/2018</a:t>
+              <a:t>7/20/2018</a:t>
             </a:fld>
             <a:endParaRPr lang="en-US" dirty="0"/>
           </a:p>
@@ -2958,7 +2958,7 @@
           <a:p>
             <a:fld id="{42A54C80-263E-416B-A8E0-580EDEADCBDC}" type="datetimeFigureOut">
               <a:rPr lang="en-US" dirty="0"/>
-              <a:t>7/19/2018</a:t>
+              <a:t>7/20/2018</a:t>
             </a:fld>
             <a:endParaRPr lang="en-US" dirty="0"/>
           </a:p>
@@ -3201,7 +3201,7 @@
             <a:fld id="{B61BEF0D-F0BB-DE4B-95CE-6DB70DBA9567}" type="datetimeFigureOut">
               <a:rPr lang="en-US" dirty="0"/>
               <a:pPr/>
-              <a:t>7/19/2018</a:t>
+              <a:t>7/20/2018</a:t>
             </a:fld>
             <a:endParaRPr lang="en-US" dirty="0"/>
           </a:p>
@@ -3429,7 +3429,7 @@
           <a:p>
             <a:fld id="{42A54C80-263E-416B-A8E0-580EDEADCBDC}" type="datetimeFigureOut">
               <a:rPr lang="en-US" dirty="0"/>
-              <a:t>7/19/2018</a:t>
+              <a:t>7/20/2018</a:t>
             </a:fld>
             <a:endParaRPr lang="en-US" dirty="0"/>
           </a:p>
@@ -3799,7 +3799,7 @@
             <a:fld id="{B61BEF0D-F0BB-DE4B-95CE-6DB70DBA9567}" type="datetimeFigureOut">
               <a:rPr lang="en-US" dirty="0"/>
               <a:pPr/>
-              <a:t>7/19/2018</a:t>
+              <a:t>7/20/2018</a:t>
             </a:fld>
             <a:endParaRPr lang="en-US" dirty="0"/>
           </a:p>
@@ -3919,7 +3919,7 @@
             <a:fld id="{B61BEF0D-F0BB-DE4B-95CE-6DB70DBA9567}" type="datetimeFigureOut">
               <a:rPr lang="en-US" dirty="0"/>
               <a:pPr/>
-              <a:t>7/19/2018</a:t>
+              <a:t>7/20/2018</a:t>
             </a:fld>
             <a:endParaRPr lang="en-US" dirty="0"/>
           </a:p>
@@ -4011,7 +4011,7 @@
             <a:fld id="{B61BEF0D-F0BB-DE4B-95CE-6DB70DBA9567}" type="datetimeFigureOut">
               <a:rPr lang="en-US" dirty="0"/>
               <a:pPr/>
-              <a:t>7/19/2018</a:t>
+              <a:t>7/20/2018</a:t>
             </a:fld>
             <a:endParaRPr lang="en-US" dirty="0"/>
           </a:p>
@@ -4262,7 +4262,7 @@
           <a:p>
             <a:fld id="{42A54C80-263E-416B-A8E0-580EDEADCBDC}" type="datetimeFigureOut">
               <a:rPr lang="en-US" dirty="0"/>
-              <a:t>7/19/2018</a:t>
+              <a:t>7/20/2018</a:t>
             </a:fld>
             <a:endParaRPr lang="en-US" dirty="0"/>
           </a:p>
@@ -4521,7 +4521,7 @@
             <a:fld id="{B61BEF0D-F0BB-DE4B-95CE-6DB70DBA9567}" type="datetimeFigureOut">
               <a:rPr lang="en-US" dirty="0"/>
               <a:pPr/>
-              <a:t>7/19/2018</a:t>
+              <a:t>7/20/2018</a:t>
             </a:fld>
             <a:endParaRPr lang="en-US" dirty="0"/>
           </a:p>
@@ -5263,7 +5263,7 @@
             <a:fld id="{B61BEF0D-F0BB-DE4B-95CE-6DB70DBA9567}" type="datetimeFigureOut">
               <a:rPr lang="en-US" dirty="0"/>
               <a:pPr/>
-              <a:t>7/19/2018</a:t>
+              <a:t>7/20/2018</a:t>
             </a:fld>
             <a:endParaRPr lang="en-US" dirty="0"/>
           </a:p>
@@ -5866,12 +5866,28 @@
               <a:t>Fresheres</a:t>
             </a:r>
             <a:r>
+              <a:rPr lang="en-US" smtClean="0">
+                <a:solidFill>
+                  <a:srgbClr val="00B050"/>
+                </a:solidFill>
+              </a:rPr>
+              <a:t> </a:t>
+            </a:r>
+            <a:r>
+              <a:rPr lang="en-US" smtClean="0">
+                <a:solidFill>
+                  <a:srgbClr val="00B050"/>
+                </a:solidFill>
+              </a:rPr>
+              <a:t> and </a:t>
+            </a:r>
+            <a:r>
               <a:rPr lang="en-US" dirty="0" smtClean="0">
                 <a:solidFill>
                   <a:srgbClr val="00B050"/>
                 </a:solidFill>
               </a:rPr>
-              <a:t> and Experienced</a:t>
+              <a:t>Experienced</a:t>
             </a:r>
             <a:r>
               <a:rPr lang="en-US" dirty="0" smtClean="0"/>

</xml_diff>